<commit_message>
declare all the df in databricks, import data into bucket S3 AWS
</commit_message>
<xml_diff>
--- a/IPL Data Analysis  Apache Spark End-To-End Data Engineering Project/Architecture of the project.pptx
+++ b/IPL Data Analysis  Apache Spark End-To-End Data Engineering Project/Architecture of the project.pptx
@@ -6,6 +6,10 @@
   </p:sldMasterIdLst>
   <p:sldIdLst>
     <p:sldId id="256" r:id="rId2"/>
+    <p:sldId id="257" r:id="rId3"/>
+    <p:sldId id="258" r:id="rId4"/>
+    <p:sldId id="259" r:id="rId5"/>
+    <p:sldId id="260" r:id="rId6"/>
   </p:sldIdLst>
   <p:sldSz cx="12192000" cy="6858000"/>
   <p:notesSz cx="6858000" cy="9144000"/>
@@ -104,6 +108,11 @@
       </a:defRPr>
     </a:lvl9pPr>
   </p:defaultTextStyle>
+  <p:extLst>
+    <p:ext uri="{EFAFB233-063F-42B5-8137-9DF3F51BA10A}">
+      <p15:sldGuideLst xmlns:p15="http://schemas.microsoft.com/office/powerpoint/2012/main"/>
+    </p:ext>
+  </p:extLst>
 </p:presentation>
 </file>
 
@@ -4203,6 +4212,1076 @@
 </p:sld>
 </file>
 
+<file path=ppt/slides/slide2.xml><?xml version="1.0" encoding="utf-8"?>
+<p:sld xmlns:a="http://schemas.openxmlformats.org/drawingml/2006/main" xmlns:r="http://schemas.openxmlformats.org/officeDocument/2006/relationships" xmlns:p="http://schemas.openxmlformats.org/presentationml/2006/main">
+  <p:cSld>
+    <p:spTree>
+      <p:nvGrpSpPr>
+        <p:cNvPr id="1" name=""/>
+        <p:cNvGrpSpPr/>
+        <p:nvPr/>
+      </p:nvGrpSpPr>
+      <p:grpSpPr>
+        <a:xfrm>
+          <a:off x="0" y="0"/>
+          <a:ext cx="0" cy="0"/>
+          <a:chOff x="0" y="0"/>
+          <a:chExt cx="0" cy="0"/>
+        </a:xfrm>
+      </p:grpSpPr>
+      <p:sp>
+        <p:nvSpPr>
+          <p:cNvPr id="4" name="Titre 3">
+            <a:extLst>
+              <a:ext uri="{FF2B5EF4-FFF2-40B4-BE49-F238E27FC236}">
+                <a16:creationId xmlns:a16="http://schemas.microsoft.com/office/drawing/2014/main" id="{25F5BE20-C341-C148-876B-60C6007126DC}"/>
+              </a:ext>
+            </a:extLst>
+          </p:cNvPr>
+          <p:cNvSpPr>
+            <a:spLocks noGrp="1"/>
+          </p:cNvSpPr>
+          <p:nvPr>
+            <p:ph type="title"/>
+          </p:nvPr>
+        </p:nvSpPr>
+        <p:spPr>
+          <a:xfrm>
+            <a:off x="923544" y="365125"/>
+            <a:ext cx="10430256" cy="787019"/>
+          </a:xfrm>
+        </p:spPr>
+        <p:txBody>
+          <a:bodyPr/>
+          <a:lstStyle/>
+          <a:p>
+            <a:r>
+              <a:rPr lang="fr-FR" dirty="0" err="1"/>
+              <a:t>Buckets</a:t>
+            </a:r>
+            <a:r>
+              <a:rPr lang="fr-FR" dirty="0"/>
+              <a:t> S3 | </a:t>
+            </a:r>
+            <a:r>
+              <a:rPr lang="fr-FR" dirty="0" err="1"/>
+              <a:t>aghilas</a:t>
+            </a:r>
+            <a:r>
+              <a:rPr lang="fr-FR" dirty="0"/>
+              <a:t>-</a:t>
+            </a:r>
+            <a:r>
+              <a:rPr lang="fr-FR" dirty="0" err="1"/>
+              <a:t>ipl</a:t>
+            </a:r>
+            <a:r>
+              <a:rPr lang="fr-FR" dirty="0"/>
+              <a:t>-data</a:t>
+            </a:r>
+          </a:p>
+        </p:txBody>
+      </p:sp>
+      <p:pic>
+        <p:nvPicPr>
+          <p:cNvPr id="6" name="Image 5">
+            <a:extLst>
+              <a:ext uri="{FF2B5EF4-FFF2-40B4-BE49-F238E27FC236}">
+                <a16:creationId xmlns:a16="http://schemas.microsoft.com/office/drawing/2014/main" id="{2FE01ECE-8FF5-496C-9AC7-61C3964D3540}"/>
+              </a:ext>
+            </a:extLst>
+          </p:cNvPr>
+          <p:cNvPicPr>
+            <a:picLocks noChangeAspect="1"/>
+          </p:cNvPicPr>
+          <p:nvPr/>
+        </p:nvPicPr>
+        <p:blipFill>
+          <a:blip r:embed="rId2"/>
+          <a:stretch>
+            <a:fillRect/>
+          </a:stretch>
+        </p:blipFill>
+        <p:spPr>
+          <a:xfrm>
+            <a:off x="4928616" y="1066994"/>
+            <a:ext cx="6749796" cy="5425881"/>
+          </a:xfrm>
+          <a:prstGeom prst="rect">
+            <a:avLst/>
+          </a:prstGeom>
+        </p:spPr>
+      </p:pic>
+      <p:sp>
+        <p:nvSpPr>
+          <p:cNvPr id="7" name="ZoneTexte 6">
+            <a:extLst>
+              <a:ext uri="{FF2B5EF4-FFF2-40B4-BE49-F238E27FC236}">
+                <a16:creationId xmlns:a16="http://schemas.microsoft.com/office/drawing/2014/main" id="{5A15F2F8-64CC-9CF3-45E9-59AB06BB86C5}"/>
+              </a:ext>
+            </a:extLst>
+          </p:cNvPr>
+          <p:cNvSpPr txBox="1"/>
+          <p:nvPr/>
+        </p:nvSpPr>
+        <p:spPr>
+          <a:xfrm>
+            <a:off x="530352" y="1737360"/>
+            <a:ext cx="3346704" cy="369332"/>
+          </a:xfrm>
+          <a:prstGeom prst="rect">
+            <a:avLst/>
+          </a:prstGeom>
+          <a:noFill/>
+        </p:spPr>
+        <p:txBody>
+          <a:bodyPr wrap="square" rtlCol="0">
+            <a:spAutoFit/>
+          </a:bodyPr>
+          <a:lstStyle/>
+          <a:p>
+            <a:r>
+              <a:rPr lang="fr-FR" dirty="0"/>
+              <a:t>Link to </a:t>
+            </a:r>
+            <a:r>
+              <a:rPr lang="fr-FR" dirty="0" err="1"/>
+              <a:t>access</a:t>
+            </a:r>
+            <a:r>
+              <a:rPr lang="fr-FR" dirty="0"/>
+              <a:t> to the </a:t>
+            </a:r>
+            <a:r>
+              <a:rPr lang="fr-FR" dirty="0" err="1"/>
+              <a:t>bucket</a:t>
+            </a:r>
+            <a:r>
+              <a:rPr lang="fr-FR" dirty="0"/>
+              <a:t> :</a:t>
+            </a:r>
+            <a:r>
+              <a:rPr lang="fr-FR" dirty="0">
+                <a:hlinkClick r:id="rId3"/>
+              </a:rPr>
+              <a:t>🔗</a:t>
+            </a:r>
+            <a:r>
+              <a:rPr lang="fr-FR" dirty="0"/>
+              <a:t> </a:t>
+            </a:r>
+          </a:p>
+        </p:txBody>
+      </p:sp>
+    </p:spTree>
+    <p:extLst>
+      <p:ext uri="{BB962C8B-B14F-4D97-AF65-F5344CB8AC3E}">
+        <p14:creationId xmlns:p14="http://schemas.microsoft.com/office/powerpoint/2010/main" val="147539635"/>
+      </p:ext>
+    </p:extLst>
+  </p:cSld>
+  <p:clrMapOvr>
+    <a:masterClrMapping/>
+  </p:clrMapOvr>
+</p:sld>
+</file>
+
+<file path=ppt/slides/slide3.xml><?xml version="1.0" encoding="utf-8"?>
+<p:sld xmlns:a="http://schemas.openxmlformats.org/drawingml/2006/main" xmlns:r="http://schemas.openxmlformats.org/officeDocument/2006/relationships" xmlns:p="http://schemas.openxmlformats.org/presentationml/2006/main">
+  <p:cSld>
+    <p:spTree>
+      <p:nvGrpSpPr>
+        <p:cNvPr id="1" name=""/>
+        <p:cNvGrpSpPr/>
+        <p:nvPr/>
+      </p:nvGrpSpPr>
+      <p:grpSpPr>
+        <a:xfrm>
+          <a:off x="0" y="0"/>
+          <a:ext cx="0" cy="0"/>
+          <a:chOff x="0" y="0"/>
+          <a:chExt cx="0" cy="0"/>
+        </a:xfrm>
+      </p:grpSpPr>
+      <p:sp>
+        <p:nvSpPr>
+          <p:cNvPr id="2" name="Titre 1">
+            <a:extLst>
+              <a:ext uri="{FF2B5EF4-FFF2-40B4-BE49-F238E27FC236}">
+                <a16:creationId xmlns:a16="http://schemas.microsoft.com/office/drawing/2014/main" id="{6721B031-E8B5-85B6-F512-6E1F0BA3DC24}"/>
+              </a:ext>
+            </a:extLst>
+          </p:cNvPr>
+          <p:cNvSpPr>
+            <a:spLocks noGrp="1"/>
+          </p:cNvSpPr>
+          <p:nvPr>
+            <p:ph type="title"/>
+          </p:nvPr>
+        </p:nvSpPr>
+        <p:spPr>
+          <a:xfrm>
+            <a:off x="838200" y="365125"/>
+            <a:ext cx="10515600" cy="668147"/>
+          </a:xfrm>
+        </p:spPr>
+        <p:txBody>
+          <a:bodyPr>
+            <a:normAutofit fontScale="90000"/>
+          </a:bodyPr>
+          <a:lstStyle/>
+          <a:p>
+            <a:r>
+              <a:rPr lang="fr-FR" dirty="0"/>
+              <a:t>Management of the S3 </a:t>
+            </a:r>
+            <a:r>
+              <a:rPr lang="fr-FR" dirty="0" err="1"/>
+              <a:t>buckets</a:t>
+            </a:r>
+            <a:r>
+              <a:rPr lang="fr-FR" dirty="0"/>
+              <a:t> </a:t>
+            </a:r>
+          </a:p>
+        </p:txBody>
+      </p:sp>
+      <p:pic>
+        <p:nvPicPr>
+          <p:cNvPr id="4" name="Image 3">
+            <a:extLst>
+              <a:ext uri="{FF2B5EF4-FFF2-40B4-BE49-F238E27FC236}">
+                <a16:creationId xmlns:a16="http://schemas.microsoft.com/office/drawing/2014/main" id="{EE5C59AE-C490-8F83-6B67-87C438DF79CD}"/>
+              </a:ext>
+            </a:extLst>
+          </p:cNvPr>
+          <p:cNvPicPr>
+            <a:picLocks noChangeAspect="1"/>
+          </p:cNvPicPr>
+          <p:nvPr/>
+        </p:nvPicPr>
+        <p:blipFill>
+          <a:blip r:embed="rId2"/>
+          <a:stretch>
+            <a:fillRect/>
+          </a:stretch>
+        </p:blipFill>
+        <p:spPr>
+          <a:xfrm>
+            <a:off x="5687569" y="1144241"/>
+            <a:ext cx="5958840" cy="5348634"/>
+          </a:xfrm>
+          <a:prstGeom prst="rect">
+            <a:avLst/>
+          </a:prstGeom>
+        </p:spPr>
+      </p:pic>
+      <p:sp>
+        <p:nvSpPr>
+          <p:cNvPr id="5" name="ZoneTexte 4">
+            <a:extLst>
+              <a:ext uri="{FF2B5EF4-FFF2-40B4-BE49-F238E27FC236}">
+                <a16:creationId xmlns:a16="http://schemas.microsoft.com/office/drawing/2014/main" id="{69A0E6A3-F65F-02FB-D387-D44F89BAAE44}"/>
+              </a:ext>
+            </a:extLst>
+          </p:cNvPr>
+          <p:cNvSpPr txBox="1"/>
+          <p:nvPr/>
+        </p:nvSpPr>
+        <p:spPr>
+          <a:xfrm>
+            <a:off x="585216" y="1618488"/>
+            <a:ext cx="5027338" cy="4016484"/>
+          </a:xfrm>
+          <a:prstGeom prst="rect">
+            <a:avLst/>
+          </a:prstGeom>
+          <a:noFill/>
+        </p:spPr>
+        <p:txBody>
+          <a:bodyPr wrap="none" rtlCol="0">
+            <a:spAutoFit/>
+          </a:bodyPr>
+          <a:lstStyle/>
+          <a:p>
+            <a:pPr marL="285750" indent="-285750">
+              <a:buFont typeface="Arial" panose="020B0604020202020204" pitchFamily="34" charset="0"/>
+              <a:buChar char="•"/>
+            </a:pPr>
+            <a:r>
+              <a:rPr lang="fr-FR" dirty="0" err="1"/>
+              <a:t>Make</a:t>
+            </a:r>
+            <a:r>
+              <a:rPr lang="fr-FR" dirty="0"/>
+              <a:t> sure to put the </a:t>
+            </a:r>
+            <a:r>
+              <a:rPr lang="fr-FR" dirty="0" err="1"/>
+              <a:t>bucket</a:t>
+            </a:r>
+            <a:r>
+              <a:rPr lang="fr-FR" dirty="0"/>
+              <a:t> public.</a:t>
+            </a:r>
+          </a:p>
+          <a:p>
+            <a:pPr marL="285750" indent="-285750">
+              <a:buFont typeface="Arial" panose="020B0604020202020204" pitchFamily="34" charset="0"/>
+              <a:buChar char="•"/>
+            </a:pPr>
+            <a:r>
+              <a:rPr lang="fr-FR" dirty="0" err="1"/>
+              <a:t>Edit</a:t>
+            </a:r>
+            <a:r>
+              <a:rPr lang="fr-FR" dirty="0"/>
+              <a:t> the </a:t>
+            </a:r>
+            <a:r>
+              <a:rPr lang="fr-FR" dirty="0" err="1"/>
+              <a:t>json</a:t>
+            </a:r>
+            <a:r>
+              <a:rPr lang="fr-FR" dirty="0"/>
+              <a:t> file :</a:t>
+            </a:r>
+          </a:p>
+          <a:p>
+            <a:pPr marL="285750" indent="-285750">
+              <a:buFont typeface="Arial" panose="020B0604020202020204" pitchFamily="34" charset="0"/>
+              <a:buChar char="•"/>
+            </a:pPr>
+            <a:endParaRPr lang="fr-FR" dirty="0"/>
+          </a:p>
+          <a:p>
+            <a:r>
+              <a:rPr lang="en-US" sz="1100" dirty="0">
+                <a:latin typeface="Courier New" panose="02070309020205020404" pitchFamily="49" charset="0"/>
+                <a:cs typeface="Courier New" panose="02070309020205020404" pitchFamily="49" charset="0"/>
+              </a:rPr>
+              <a:t>{</a:t>
+            </a:r>
+          </a:p>
+          <a:p>
+            <a:r>
+              <a:rPr lang="en-US" sz="1100" dirty="0">
+                <a:latin typeface="Courier New" panose="02070309020205020404" pitchFamily="49" charset="0"/>
+                <a:cs typeface="Courier New" panose="02070309020205020404" pitchFamily="49" charset="0"/>
+              </a:rPr>
+              <a:t>    "Version": "2012-10-17",</a:t>
+            </a:r>
+          </a:p>
+          <a:p>
+            <a:r>
+              <a:rPr lang="en-US" sz="1100" dirty="0">
+                <a:latin typeface="Courier New" panose="02070309020205020404" pitchFamily="49" charset="0"/>
+                <a:cs typeface="Courier New" panose="02070309020205020404" pitchFamily="49" charset="0"/>
+              </a:rPr>
+              <a:t>    "Statement": [</a:t>
+            </a:r>
+          </a:p>
+          <a:p>
+            <a:r>
+              <a:rPr lang="en-US" sz="1100" dirty="0">
+                <a:latin typeface="Courier New" panose="02070309020205020404" pitchFamily="49" charset="0"/>
+                <a:cs typeface="Courier New" panose="02070309020205020404" pitchFamily="49" charset="0"/>
+              </a:rPr>
+              <a:t>        {</a:t>
+            </a:r>
+          </a:p>
+          <a:p>
+            <a:r>
+              <a:rPr lang="en-US" sz="1100" dirty="0">
+                <a:latin typeface="Courier New" panose="02070309020205020404" pitchFamily="49" charset="0"/>
+                <a:cs typeface="Courier New" panose="02070309020205020404" pitchFamily="49" charset="0"/>
+              </a:rPr>
+              <a:t>            "Sid": "</a:t>
+            </a:r>
+            <a:r>
+              <a:rPr lang="en-US" sz="1100" dirty="0" err="1">
+                <a:latin typeface="Courier New" panose="02070309020205020404" pitchFamily="49" charset="0"/>
+                <a:cs typeface="Courier New" panose="02070309020205020404" pitchFamily="49" charset="0"/>
+              </a:rPr>
+              <a:t>PublicRead</a:t>
+            </a:r>
+            <a:r>
+              <a:rPr lang="en-US" sz="1100" dirty="0">
+                <a:latin typeface="Courier New" panose="02070309020205020404" pitchFamily="49" charset="0"/>
+                <a:cs typeface="Courier New" panose="02070309020205020404" pitchFamily="49" charset="0"/>
+              </a:rPr>
+              <a:t>",</a:t>
+            </a:r>
+          </a:p>
+          <a:p>
+            <a:r>
+              <a:rPr lang="en-US" sz="1100" dirty="0">
+                <a:latin typeface="Courier New" panose="02070309020205020404" pitchFamily="49" charset="0"/>
+                <a:cs typeface="Courier New" panose="02070309020205020404" pitchFamily="49" charset="0"/>
+              </a:rPr>
+              <a:t>            "Effect": "Allow",</a:t>
+            </a:r>
+          </a:p>
+          <a:p>
+            <a:r>
+              <a:rPr lang="en-US" sz="1100" dirty="0">
+                <a:latin typeface="Courier New" panose="02070309020205020404" pitchFamily="49" charset="0"/>
+                <a:cs typeface="Courier New" panose="02070309020205020404" pitchFamily="49" charset="0"/>
+              </a:rPr>
+              <a:t>            "Principal": "*",</a:t>
+            </a:r>
+          </a:p>
+          <a:p>
+            <a:r>
+              <a:rPr lang="en-US" sz="1100" dirty="0">
+                <a:latin typeface="Courier New" panose="02070309020205020404" pitchFamily="49" charset="0"/>
+                <a:cs typeface="Courier New" panose="02070309020205020404" pitchFamily="49" charset="0"/>
+              </a:rPr>
+              <a:t>            "Action": [</a:t>
+            </a:r>
+          </a:p>
+          <a:p>
+            <a:r>
+              <a:rPr lang="en-US" sz="1100" dirty="0">
+                <a:latin typeface="Courier New" panose="02070309020205020404" pitchFamily="49" charset="0"/>
+                <a:cs typeface="Courier New" panose="02070309020205020404" pitchFamily="49" charset="0"/>
+              </a:rPr>
+              <a:t>                "s3:GetObject",</a:t>
+            </a:r>
+          </a:p>
+          <a:p>
+            <a:r>
+              <a:rPr lang="en-US" sz="1100" dirty="0">
+                <a:latin typeface="Courier New" panose="02070309020205020404" pitchFamily="49" charset="0"/>
+                <a:cs typeface="Courier New" panose="02070309020205020404" pitchFamily="49" charset="0"/>
+              </a:rPr>
+              <a:t>                "s3:GetObjectVersion"</a:t>
+            </a:r>
+          </a:p>
+          <a:p>
+            <a:r>
+              <a:rPr lang="en-US" sz="1100" dirty="0">
+                <a:latin typeface="Courier New" panose="02070309020205020404" pitchFamily="49" charset="0"/>
+                <a:cs typeface="Courier New" panose="02070309020205020404" pitchFamily="49" charset="0"/>
+              </a:rPr>
+              <a:t>            ],</a:t>
+            </a:r>
+          </a:p>
+          <a:p>
+            <a:r>
+              <a:rPr lang="en-US" sz="1100" dirty="0">
+                <a:latin typeface="Courier New" panose="02070309020205020404" pitchFamily="49" charset="0"/>
+                <a:cs typeface="Courier New" panose="02070309020205020404" pitchFamily="49" charset="0"/>
+              </a:rPr>
+              <a:t>            "Resource": "arn:aws:s3:::</a:t>
+            </a:r>
+            <a:r>
+              <a:rPr lang="en-US" sz="1100" dirty="0" err="1">
+                <a:latin typeface="Courier New" panose="02070309020205020404" pitchFamily="49" charset="0"/>
+                <a:cs typeface="Courier New" panose="02070309020205020404" pitchFamily="49" charset="0"/>
+              </a:rPr>
+              <a:t>aghilas</a:t>
+            </a:r>
+            <a:r>
+              <a:rPr lang="en-US" sz="1100" dirty="0">
+                <a:latin typeface="Courier New" panose="02070309020205020404" pitchFamily="49" charset="0"/>
+                <a:cs typeface="Courier New" panose="02070309020205020404" pitchFamily="49" charset="0"/>
+              </a:rPr>
+              <a:t>-</a:t>
+            </a:r>
+            <a:r>
+              <a:rPr lang="en-US" sz="1100" dirty="0" err="1">
+                <a:latin typeface="Courier New" panose="02070309020205020404" pitchFamily="49" charset="0"/>
+                <a:cs typeface="Courier New" panose="02070309020205020404" pitchFamily="49" charset="0"/>
+              </a:rPr>
+              <a:t>ipl</a:t>
+            </a:r>
+            <a:r>
+              <a:rPr lang="en-US" sz="1100" dirty="0">
+                <a:latin typeface="Courier New" panose="02070309020205020404" pitchFamily="49" charset="0"/>
+                <a:cs typeface="Courier New" panose="02070309020205020404" pitchFamily="49" charset="0"/>
+              </a:rPr>
+              <a:t>-data/*"</a:t>
+            </a:r>
+          </a:p>
+          <a:p>
+            <a:r>
+              <a:rPr lang="en-US" sz="1100" dirty="0">
+                <a:latin typeface="Courier New" panose="02070309020205020404" pitchFamily="49" charset="0"/>
+                <a:cs typeface="Courier New" panose="02070309020205020404" pitchFamily="49" charset="0"/>
+              </a:rPr>
+              <a:t>        }</a:t>
+            </a:r>
+          </a:p>
+          <a:p>
+            <a:r>
+              <a:rPr lang="en-US" sz="1100" dirty="0">
+                <a:latin typeface="Courier New" panose="02070309020205020404" pitchFamily="49" charset="0"/>
+                <a:cs typeface="Courier New" panose="02070309020205020404" pitchFamily="49" charset="0"/>
+              </a:rPr>
+              <a:t>    ]</a:t>
+            </a:r>
+          </a:p>
+          <a:p>
+            <a:r>
+              <a:rPr lang="en-US" sz="1100" dirty="0">
+                <a:latin typeface="Courier New" panose="02070309020205020404" pitchFamily="49" charset="0"/>
+                <a:cs typeface="Courier New" panose="02070309020205020404" pitchFamily="49" charset="0"/>
+              </a:rPr>
+              <a:t>}</a:t>
+            </a:r>
+            <a:endParaRPr lang="fr-FR" sz="1100" dirty="0">
+              <a:latin typeface="Courier New" panose="02070309020205020404" pitchFamily="49" charset="0"/>
+              <a:cs typeface="Courier New" panose="02070309020205020404" pitchFamily="49" charset="0"/>
+            </a:endParaRPr>
+          </a:p>
+          <a:p>
+            <a:endParaRPr lang="fr-FR" dirty="0"/>
+          </a:p>
+          <a:p>
+            <a:r>
+              <a:rPr lang="fr-FR" dirty="0"/>
+              <a:t>	</a:t>
+            </a:r>
+          </a:p>
+        </p:txBody>
+      </p:sp>
+    </p:spTree>
+    <p:extLst>
+      <p:ext uri="{BB962C8B-B14F-4D97-AF65-F5344CB8AC3E}">
+        <p14:creationId xmlns:p14="http://schemas.microsoft.com/office/powerpoint/2010/main" val="3891330444"/>
+      </p:ext>
+    </p:extLst>
+  </p:cSld>
+  <p:clrMapOvr>
+    <a:masterClrMapping/>
+  </p:clrMapOvr>
+</p:sld>
+</file>
+
+<file path=ppt/slides/slide4.xml><?xml version="1.0" encoding="utf-8"?>
+<p:sld xmlns:a="http://schemas.openxmlformats.org/drawingml/2006/main" xmlns:r="http://schemas.openxmlformats.org/officeDocument/2006/relationships" xmlns:p="http://schemas.openxmlformats.org/presentationml/2006/main">
+  <p:cSld>
+    <p:spTree>
+      <p:nvGrpSpPr>
+        <p:cNvPr id="1" name=""/>
+        <p:cNvGrpSpPr/>
+        <p:nvPr/>
+      </p:nvGrpSpPr>
+      <p:grpSpPr>
+        <a:xfrm>
+          <a:off x="0" y="0"/>
+          <a:ext cx="0" cy="0"/>
+          <a:chOff x="0" y="0"/>
+          <a:chExt cx="0" cy="0"/>
+        </a:xfrm>
+      </p:grpSpPr>
+      <p:sp>
+        <p:nvSpPr>
+          <p:cNvPr id="2" name="Titre 1">
+            <a:extLst>
+              <a:ext uri="{FF2B5EF4-FFF2-40B4-BE49-F238E27FC236}">
+                <a16:creationId xmlns:a16="http://schemas.microsoft.com/office/drawing/2014/main" id="{A9E385ED-9622-A451-FD9F-BED762C7BF71}"/>
+              </a:ext>
+            </a:extLst>
+          </p:cNvPr>
+          <p:cNvSpPr>
+            <a:spLocks noGrp="1"/>
+          </p:cNvSpPr>
+          <p:nvPr>
+            <p:ph type="title"/>
+          </p:nvPr>
+        </p:nvSpPr>
+        <p:spPr>
+          <a:xfrm>
+            <a:off x="838200" y="365125"/>
+            <a:ext cx="8744712" cy="704723"/>
+          </a:xfrm>
+        </p:spPr>
+        <p:txBody>
+          <a:bodyPr>
+            <a:normAutofit/>
+          </a:bodyPr>
+          <a:lstStyle/>
+          <a:p>
+            <a:r>
+              <a:rPr lang="fr-FR" sz="4000" dirty="0"/>
+              <a:t>Community </a:t>
+            </a:r>
+            <a:r>
+              <a:rPr lang="fr-FR" sz="4000" dirty="0" err="1"/>
+              <a:t>edition</a:t>
+            </a:r>
+            <a:r>
+              <a:rPr lang="fr-FR" sz="4000" dirty="0"/>
+              <a:t> </a:t>
+            </a:r>
+            <a:r>
+              <a:rPr lang="fr-FR" sz="4000" dirty="0" err="1"/>
+              <a:t>accound</a:t>
+            </a:r>
+            <a:r>
+              <a:rPr lang="fr-FR" sz="4000" dirty="0"/>
+              <a:t> (</a:t>
+            </a:r>
+            <a:r>
+              <a:rPr lang="fr-FR" sz="4000" dirty="0" err="1"/>
+              <a:t>dataBricks</a:t>
+            </a:r>
+            <a:r>
+              <a:rPr lang="fr-FR" sz="4000" dirty="0"/>
+              <a:t>)</a:t>
+            </a:r>
+          </a:p>
+        </p:txBody>
+      </p:sp>
+      <p:pic>
+        <p:nvPicPr>
+          <p:cNvPr id="4" name="Image 3">
+            <a:extLst>
+              <a:ext uri="{FF2B5EF4-FFF2-40B4-BE49-F238E27FC236}">
+                <a16:creationId xmlns:a16="http://schemas.microsoft.com/office/drawing/2014/main" id="{2F1A3FBE-EAC2-4D03-CB19-3AA1BBC92C57}"/>
+              </a:ext>
+            </a:extLst>
+          </p:cNvPr>
+          <p:cNvPicPr>
+            <a:picLocks noChangeAspect="1"/>
+          </p:cNvPicPr>
+          <p:nvPr/>
+        </p:nvPicPr>
+        <p:blipFill>
+          <a:blip r:embed="rId2"/>
+          <a:stretch>
+            <a:fillRect/>
+          </a:stretch>
+        </p:blipFill>
+        <p:spPr>
+          <a:xfrm>
+            <a:off x="3712463" y="1876898"/>
+            <a:ext cx="8121843" cy="4734213"/>
+          </a:xfrm>
+          <a:prstGeom prst="rect">
+            <a:avLst/>
+          </a:prstGeom>
+        </p:spPr>
+      </p:pic>
+    </p:spTree>
+    <p:extLst>
+      <p:ext uri="{BB962C8B-B14F-4D97-AF65-F5344CB8AC3E}">
+        <p14:creationId xmlns:p14="http://schemas.microsoft.com/office/powerpoint/2010/main" val="3608382763"/>
+      </p:ext>
+    </p:extLst>
+  </p:cSld>
+  <p:clrMapOvr>
+    <a:masterClrMapping/>
+  </p:clrMapOvr>
+</p:sld>
+</file>
+
+<file path=ppt/slides/slide5.xml><?xml version="1.0" encoding="utf-8"?>
+<p:sld xmlns:a="http://schemas.openxmlformats.org/drawingml/2006/main" xmlns:r="http://schemas.openxmlformats.org/officeDocument/2006/relationships" xmlns:p="http://schemas.openxmlformats.org/presentationml/2006/main">
+  <p:cSld>
+    <p:spTree>
+      <p:nvGrpSpPr>
+        <p:cNvPr id="1" name=""/>
+        <p:cNvGrpSpPr/>
+        <p:nvPr/>
+      </p:nvGrpSpPr>
+      <p:grpSpPr>
+        <a:xfrm>
+          <a:off x="0" y="0"/>
+          <a:ext cx="0" cy="0"/>
+          <a:chOff x="0" y="0"/>
+          <a:chExt cx="0" cy="0"/>
+        </a:xfrm>
+      </p:grpSpPr>
+      <p:sp>
+        <p:nvSpPr>
+          <p:cNvPr id="2" name="Titre 1">
+            <a:extLst>
+              <a:ext uri="{FF2B5EF4-FFF2-40B4-BE49-F238E27FC236}">
+                <a16:creationId xmlns:a16="http://schemas.microsoft.com/office/drawing/2014/main" id="{61CEEA35-5749-4E40-4308-4E6889866FB3}"/>
+              </a:ext>
+            </a:extLst>
+          </p:cNvPr>
+          <p:cNvSpPr>
+            <a:spLocks noGrp="1"/>
+          </p:cNvSpPr>
+          <p:nvPr>
+            <p:ph type="title"/>
+          </p:nvPr>
+        </p:nvSpPr>
+        <p:spPr>
+          <a:xfrm>
+            <a:off x="838200" y="365125"/>
+            <a:ext cx="9631680" cy="732155"/>
+          </a:xfrm>
+        </p:spPr>
+        <p:txBody>
+          <a:bodyPr/>
+          <a:lstStyle/>
+          <a:p>
+            <a:r>
+              <a:rPr lang="fr-FR" dirty="0"/>
+              <a:t>Configuration the </a:t>
+            </a:r>
+            <a:r>
+              <a:rPr lang="fr-FR" dirty="0" err="1"/>
+              <a:t>databrikcs</a:t>
+            </a:r>
+            <a:r>
+              <a:rPr lang="fr-FR" dirty="0"/>
+              <a:t> </a:t>
+            </a:r>
+            <a:r>
+              <a:rPr lang="fr-FR" dirty="0" err="1"/>
+              <a:t>account</a:t>
+            </a:r>
+            <a:endParaRPr lang="fr-FR" dirty="0"/>
+          </a:p>
+        </p:txBody>
+      </p:sp>
+      <p:pic>
+        <p:nvPicPr>
+          <p:cNvPr id="4" name="Image 3">
+            <a:extLst>
+              <a:ext uri="{FF2B5EF4-FFF2-40B4-BE49-F238E27FC236}">
+                <a16:creationId xmlns:a16="http://schemas.microsoft.com/office/drawing/2014/main" id="{F908C2C3-9780-E261-BD6D-4BB496D22D17}"/>
+              </a:ext>
+            </a:extLst>
+          </p:cNvPr>
+          <p:cNvPicPr>
+            <a:picLocks noChangeAspect="1"/>
+          </p:cNvPicPr>
+          <p:nvPr/>
+        </p:nvPicPr>
+        <p:blipFill>
+          <a:blip r:embed="rId2"/>
+          <a:stretch>
+            <a:fillRect/>
+          </a:stretch>
+        </p:blipFill>
+        <p:spPr>
+          <a:xfrm>
+            <a:off x="2931920" y="1354458"/>
+            <a:ext cx="9126224" cy="5410955"/>
+          </a:xfrm>
+          <a:prstGeom prst="rect">
+            <a:avLst/>
+          </a:prstGeom>
+        </p:spPr>
+      </p:pic>
+      <p:cxnSp>
+        <p:nvCxnSpPr>
+          <p:cNvPr id="6" name="Connecteur droit avec flèche 5">
+            <a:extLst>
+              <a:ext uri="{FF2B5EF4-FFF2-40B4-BE49-F238E27FC236}">
+                <a16:creationId xmlns:a16="http://schemas.microsoft.com/office/drawing/2014/main" id="{4E6A2227-C8AD-892E-1C97-164DD048F01D}"/>
+              </a:ext>
+            </a:extLst>
+          </p:cNvPr>
+          <p:cNvCxnSpPr>
+            <a:cxnSpLocks/>
+          </p:cNvCxnSpPr>
+          <p:nvPr/>
+        </p:nvCxnSpPr>
+        <p:spPr>
+          <a:xfrm>
+            <a:off x="1709928" y="4535424"/>
+            <a:ext cx="1389888" cy="146304"/>
+          </a:xfrm>
+          <a:prstGeom prst="straightConnector1">
+            <a:avLst/>
+          </a:prstGeom>
+          <a:ln w="28575">
+            <a:tailEnd type="triangle"/>
+          </a:ln>
+        </p:spPr>
+        <p:style>
+          <a:lnRef idx="1">
+            <a:schemeClr val="accent4"/>
+          </a:lnRef>
+          <a:fillRef idx="0">
+            <a:schemeClr val="accent4"/>
+          </a:fillRef>
+          <a:effectRef idx="0">
+            <a:schemeClr val="accent4"/>
+          </a:effectRef>
+          <a:fontRef idx="minor">
+            <a:schemeClr val="tx1"/>
+          </a:fontRef>
+        </p:style>
+      </p:cxnSp>
+      <p:cxnSp>
+        <p:nvCxnSpPr>
+          <p:cNvPr id="9" name="Connecteur droit avec flèche 8">
+            <a:extLst>
+              <a:ext uri="{FF2B5EF4-FFF2-40B4-BE49-F238E27FC236}">
+                <a16:creationId xmlns:a16="http://schemas.microsoft.com/office/drawing/2014/main" id="{95CA1914-4CB5-E9E0-2948-59CFDA0979BE}"/>
+              </a:ext>
+            </a:extLst>
+          </p:cNvPr>
+          <p:cNvCxnSpPr>
+            <a:cxnSpLocks/>
+          </p:cNvCxnSpPr>
+          <p:nvPr/>
+        </p:nvCxnSpPr>
+        <p:spPr>
+          <a:xfrm>
+            <a:off x="1709928" y="2871789"/>
+            <a:ext cx="1389888" cy="228027"/>
+          </a:xfrm>
+          <a:prstGeom prst="straightConnector1">
+            <a:avLst/>
+          </a:prstGeom>
+          <a:ln w="28575">
+            <a:tailEnd type="triangle"/>
+          </a:ln>
+        </p:spPr>
+        <p:style>
+          <a:lnRef idx="1">
+            <a:schemeClr val="accent4"/>
+          </a:lnRef>
+          <a:fillRef idx="0">
+            <a:schemeClr val="accent4"/>
+          </a:fillRef>
+          <a:effectRef idx="0">
+            <a:schemeClr val="accent4"/>
+          </a:effectRef>
+          <a:fontRef idx="minor">
+            <a:schemeClr val="tx1"/>
+          </a:fontRef>
+        </p:style>
+      </p:cxnSp>
+      <p:cxnSp>
+        <p:nvCxnSpPr>
+          <p:cNvPr id="11" name="Connecteur droit avec flèche 10">
+            <a:extLst>
+              <a:ext uri="{FF2B5EF4-FFF2-40B4-BE49-F238E27FC236}">
+                <a16:creationId xmlns:a16="http://schemas.microsoft.com/office/drawing/2014/main" id="{50A5D288-71A6-A591-35BD-AEA47D74D65D}"/>
+              </a:ext>
+            </a:extLst>
+          </p:cNvPr>
+          <p:cNvCxnSpPr>
+            <a:cxnSpLocks/>
+          </p:cNvCxnSpPr>
+          <p:nvPr/>
+        </p:nvCxnSpPr>
+        <p:spPr>
+          <a:xfrm flipH="1" flipV="1">
+            <a:off x="9893808" y="3429000"/>
+            <a:ext cx="356616" cy="1956816"/>
+          </a:xfrm>
+          <a:prstGeom prst="straightConnector1">
+            <a:avLst/>
+          </a:prstGeom>
+          <a:ln w="28575">
+            <a:tailEnd type="triangle"/>
+          </a:ln>
+        </p:spPr>
+        <p:style>
+          <a:lnRef idx="1">
+            <a:schemeClr val="accent4"/>
+          </a:lnRef>
+          <a:fillRef idx="0">
+            <a:schemeClr val="accent4"/>
+          </a:fillRef>
+          <a:effectRef idx="0">
+            <a:schemeClr val="accent4"/>
+          </a:effectRef>
+          <a:fontRef idx="minor">
+            <a:schemeClr val="tx1"/>
+          </a:fontRef>
+        </p:style>
+      </p:cxnSp>
+      <p:sp>
+        <p:nvSpPr>
+          <p:cNvPr id="14" name="Ellipse 13">
+            <a:extLst>
+              <a:ext uri="{FF2B5EF4-FFF2-40B4-BE49-F238E27FC236}">
+                <a16:creationId xmlns:a16="http://schemas.microsoft.com/office/drawing/2014/main" id="{D8DA6743-AB3A-BE05-3174-802048AE5B75}"/>
+              </a:ext>
+            </a:extLst>
+          </p:cNvPr>
+          <p:cNvSpPr/>
+          <p:nvPr/>
+        </p:nvSpPr>
+        <p:spPr>
+          <a:xfrm>
+            <a:off x="384048" y="2253996"/>
+            <a:ext cx="1389888" cy="1042416"/>
+          </a:xfrm>
+          <a:prstGeom prst="ellipse">
+            <a:avLst/>
+          </a:prstGeom>
+        </p:spPr>
+        <p:style>
+          <a:lnRef idx="2">
+            <a:schemeClr val="accent1">
+              <a:shade val="15000"/>
+            </a:schemeClr>
+          </a:lnRef>
+          <a:fillRef idx="1">
+            <a:schemeClr val="accent1"/>
+          </a:fillRef>
+          <a:effectRef idx="0">
+            <a:schemeClr val="accent1"/>
+          </a:effectRef>
+          <a:fontRef idx="minor">
+            <a:schemeClr val="lt1"/>
+          </a:fontRef>
+        </p:style>
+        <p:txBody>
+          <a:bodyPr rtlCol="0" anchor="ctr"/>
+          <a:lstStyle/>
+          <a:p>
+            <a:pPr algn="ctr"/>
+            <a:r>
+              <a:rPr lang="fr-FR" sz="1200" dirty="0" err="1"/>
+              <a:t>Create</a:t>
+            </a:r>
+            <a:r>
+              <a:rPr lang="fr-FR" sz="1200" dirty="0"/>
+              <a:t> new notebook</a:t>
+            </a:r>
+          </a:p>
+        </p:txBody>
+      </p:sp>
+      <p:sp>
+        <p:nvSpPr>
+          <p:cNvPr id="15" name="Ellipse 14">
+            <a:extLst>
+              <a:ext uri="{FF2B5EF4-FFF2-40B4-BE49-F238E27FC236}">
+                <a16:creationId xmlns:a16="http://schemas.microsoft.com/office/drawing/2014/main" id="{7B74A060-C00A-FCC0-62FE-6A1E655D5098}"/>
+              </a:ext>
+            </a:extLst>
+          </p:cNvPr>
+          <p:cNvSpPr/>
+          <p:nvPr/>
+        </p:nvSpPr>
+        <p:spPr>
+          <a:xfrm>
+            <a:off x="320040" y="4059935"/>
+            <a:ext cx="1389888" cy="1042416"/>
+          </a:xfrm>
+          <a:prstGeom prst="ellipse">
+            <a:avLst/>
+          </a:prstGeom>
+        </p:spPr>
+        <p:style>
+          <a:lnRef idx="2">
+            <a:schemeClr val="accent1">
+              <a:shade val="15000"/>
+            </a:schemeClr>
+          </a:lnRef>
+          <a:fillRef idx="1">
+            <a:schemeClr val="accent1"/>
+          </a:fillRef>
+          <a:effectRef idx="0">
+            <a:schemeClr val="accent1"/>
+          </a:effectRef>
+          <a:fontRef idx="minor">
+            <a:schemeClr val="lt1"/>
+          </a:fontRef>
+        </p:style>
+        <p:txBody>
+          <a:bodyPr rtlCol="0" anchor="ctr"/>
+          <a:lstStyle/>
+          <a:p>
+            <a:pPr algn="ctr"/>
+            <a:r>
+              <a:rPr lang="fr-FR" sz="1200" dirty="0" err="1"/>
+              <a:t>Create</a:t>
+            </a:r>
+            <a:r>
+              <a:rPr lang="fr-FR" sz="1200" dirty="0"/>
+              <a:t> a computer (librairie of </a:t>
+            </a:r>
+            <a:r>
+              <a:rPr lang="fr-FR" sz="1200" dirty="0" err="1"/>
+              <a:t>spark</a:t>
+            </a:r>
+            <a:r>
+              <a:rPr lang="fr-FR" sz="1200" dirty="0"/>
+              <a:t> …)</a:t>
+            </a:r>
+          </a:p>
+        </p:txBody>
+      </p:sp>
+      <p:sp>
+        <p:nvSpPr>
+          <p:cNvPr id="16" name="Ellipse 15">
+            <a:extLst>
+              <a:ext uri="{FF2B5EF4-FFF2-40B4-BE49-F238E27FC236}">
+                <a16:creationId xmlns:a16="http://schemas.microsoft.com/office/drawing/2014/main" id="{883B8732-8651-3602-8AF6-986CEAD22987}"/>
+              </a:ext>
+            </a:extLst>
+          </p:cNvPr>
+          <p:cNvSpPr/>
+          <p:nvPr/>
+        </p:nvSpPr>
+        <p:spPr>
+          <a:xfrm>
+            <a:off x="9643872" y="5385816"/>
+            <a:ext cx="1389888" cy="1042416"/>
+          </a:xfrm>
+          <a:prstGeom prst="ellipse">
+            <a:avLst/>
+          </a:prstGeom>
+        </p:spPr>
+        <p:style>
+          <a:lnRef idx="2">
+            <a:schemeClr val="accent1">
+              <a:shade val="15000"/>
+            </a:schemeClr>
+          </a:lnRef>
+          <a:fillRef idx="1">
+            <a:schemeClr val="accent1"/>
+          </a:fillRef>
+          <a:effectRef idx="0">
+            <a:schemeClr val="accent1"/>
+          </a:effectRef>
+          <a:fontRef idx="minor">
+            <a:schemeClr val="lt1"/>
+          </a:fontRef>
+        </p:style>
+        <p:txBody>
+          <a:bodyPr rtlCol="0" anchor="ctr"/>
+          <a:lstStyle/>
+          <a:p>
+            <a:pPr algn="ctr"/>
+            <a:r>
+              <a:rPr lang="fr-FR" sz="1200" dirty="0" err="1"/>
+              <a:t>Choose</a:t>
+            </a:r>
+            <a:r>
+              <a:rPr lang="fr-FR" sz="1200" dirty="0"/>
+              <a:t> the </a:t>
+            </a:r>
+            <a:r>
+              <a:rPr lang="fr-FR" sz="1200" dirty="0" err="1"/>
+              <a:t>the</a:t>
+            </a:r>
+            <a:r>
+              <a:rPr lang="fr-FR" sz="1200" dirty="0"/>
+              <a:t> computer </a:t>
+            </a:r>
+          </a:p>
+        </p:txBody>
+      </p:sp>
+    </p:spTree>
+    <p:extLst>
+      <p:ext uri="{BB962C8B-B14F-4D97-AF65-F5344CB8AC3E}">
+        <p14:creationId xmlns:p14="http://schemas.microsoft.com/office/powerpoint/2010/main" val="1872153601"/>
+      </p:ext>
+    </p:extLst>
+  </p:cSld>
+  <p:clrMapOvr>
+    <a:masterClrMapping/>
+  </p:clrMapOvr>
+</p:sld>
+</file>
+
 <file path=ppt/theme/theme1.xml><?xml version="1.0" encoding="utf-8"?>
 <a:theme xmlns:a="http://schemas.openxmlformats.org/drawingml/2006/main" name="Thème Office">
   <a:themeElements>

</xml_diff>